<commit_message>
updated SVD/PCA and lecture 1
</commit_message>
<xml_diff>
--- a/Lecture and Notes/Lecture 1.pptx
+++ b/Lecture and Notes/Lecture 1.pptx
@@ -18,21 +18,23 @@
     <p:sldId id="263" r:id="rId13"/>
     <p:sldId id="264" r:id="rId14"/>
     <p:sldId id="265" r:id="rId15"/>
+    <p:sldId id="266" r:id="rId16"/>
+    <p:sldId id="267" r:id="rId17"/>
   </p:sldIdLst>
   <p:sldSz cy="5143500" cx="9144000"/>
   <p:notesSz cx="6858000" cy="9144000"/>
   <p:embeddedFontLst>
     <p:embeddedFont>
       <p:font typeface="Nunito"/>
-      <p:regular r:id="rId16"/>
-      <p:bold r:id="rId17"/>
-      <p:italic r:id="rId18"/>
-      <p:boldItalic r:id="rId19"/>
+      <p:regular r:id="rId18"/>
+      <p:bold r:id="rId19"/>
+      <p:italic r:id="rId20"/>
+      <p:boldItalic r:id="rId21"/>
     </p:embeddedFont>
     <p:embeddedFont>
       <p:font typeface="Maven Pro"/>
-      <p:regular r:id="rId20"/>
-      <p:bold r:id="rId21"/>
+      <p:regular r:id="rId22"/>
+      <p:bold r:id="rId23"/>
     </p:embeddedFont>
   </p:embeddedFontLst>
   <p:defaultTextStyle>
@@ -813,7 +815,7 @@
   <p:cSld>
     <p:spTree>
       <p:nvGrpSpPr>
-        <p:cNvPr id="326" name="Shape 326"/>
+        <p:cNvPr id="325" name="Shape 325"/>
         <p:cNvGrpSpPr/>
         <p:nvPr/>
       </p:nvGrpSpPr>
@@ -827,7 +829,7 @@
       </p:grpSpPr>
       <p:sp>
         <p:nvSpPr>
-          <p:cNvPr id="327" name="Google Shape;327;gaea034a4cb_0_14:notes"/>
+          <p:cNvPr id="326" name="Google Shape;326;ga89d943cba_1_20:notes"/>
           <p:cNvSpPr/>
           <p:nvPr>
             <p:ph idx="2" type="sldImg"/>
@@ -862,7 +864,205 @@
       </p:sp>
       <p:sp>
         <p:nvSpPr>
-          <p:cNvPr id="328" name="Google Shape;328;gaea034a4cb_0_14:notes"/>
+          <p:cNvPr id="327" name="Google Shape;327;ga89d943cba_1_20:notes"/>
+          <p:cNvSpPr txBox="1"/>
+          <p:nvPr>
+            <p:ph idx="1" type="body"/>
+          </p:nvPr>
+        </p:nvSpPr>
+        <p:spPr>
+          <a:xfrm>
+            <a:off x="685800" y="4343400"/>
+            <a:ext cx="5486400" cy="4114800"/>
+          </a:xfrm>
+          <a:prstGeom prst="rect">
+            <a:avLst/>
+          </a:prstGeom>
+        </p:spPr>
+        <p:txBody>
+          <a:bodyPr anchorCtr="0" anchor="t" bIns="91425" lIns="91425" spcFirstLastPara="1" rIns="91425" wrap="square" tIns="91425">
+            <a:noAutofit/>
+          </a:bodyPr>
+          <a:lstStyle/>
+          <a:p>
+            <a:pPr indent="0" lvl="0" marL="0" rtl="0" algn="l">
+              <a:spcBef>
+                <a:spcPts val="0"/>
+              </a:spcBef>
+              <a:spcAft>
+                <a:spcPts val="0"/>
+              </a:spcAft>
+              <a:buNone/>
+            </a:pPr>
+            <a:r>
+              <a:t/>
+            </a:r>
+            <a:endParaRPr/>
+          </a:p>
+        </p:txBody>
+      </p:sp>
+    </p:spTree>
+  </p:cSld>
+  <p:clrMapOvr>
+    <a:masterClrMapping/>
+  </p:clrMapOvr>
+</p:notes>
+</file>
+
+<file path=ppt/notesSlides/notesSlide11.xml><?xml version="1.0" encoding="utf-8"?>
+<p:notes xmlns:a="http://schemas.openxmlformats.org/drawingml/2006/main" xmlns:r="http://schemas.openxmlformats.org/officeDocument/2006/relationships" xmlns:mc="http://schemas.openxmlformats.org/markup-compatibility/2006" xmlns:mv="urn:schemas-microsoft-com:mac:vml" xmlns:p="http://schemas.openxmlformats.org/presentationml/2006/main" xmlns:c="http://schemas.openxmlformats.org/drawingml/2006/chart" xmlns:dgm="http://schemas.openxmlformats.org/drawingml/2006/diagram" xmlns:o="urn:schemas-microsoft-com:office:office" xmlns:v="urn:schemas-microsoft-com:vml" xmlns:pvml="urn:schemas-microsoft-com:office:powerpoint" xmlns:com="http://schemas.openxmlformats.org/drawingml/2006/compatibility" xmlns:p14="http://schemas.microsoft.com/office/powerpoint/2010/main" xmlns:p15="http://schemas.microsoft.com/office/powerpoint/2012/main" xmlns:ahyp="http://schemas.microsoft.com/office/drawing/2018/hyperlinkcolor" showMasterPhAnim="0" showMasterSp="0">
+  <p:cSld>
+    <p:spTree>
+      <p:nvGrpSpPr>
+        <p:cNvPr id="332" name="Shape 332"/>
+        <p:cNvGrpSpPr/>
+        <p:nvPr/>
+      </p:nvGrpSpPr>
+      <p:grpSpPr>
+        <a:xfrm>
+          <a:off x="0" y="0"/>
+          <a:ext cx="0" cy="0"/>
+          <a:chOff x="0" y="0"/>
+          <a:chExt cx="0" cy="0"/>
+        </a:xfrm>
+      </p:grpSpPr>
+      <p:sp>
+        <p:nvSpPr>
+          <p:cNvPr id="333" name="Google Shape;333;gaea034a4cb_0_14:notes"/>
+          <p:cNvSpPr/>
+          <p:nvPr>
+            <p:ph idx="2" type="sldImg"/>
+          </p:nvPr>
+        </p:nvSpPr>
+        <p:spPr>
+          <a:xfrm>
+            <a:off x="381300" y="685800"/>
+            <a:ext cx="6096000" cy="3429000"/>
+          </a:xfrm>
+          <a:custGeom>
+            <a:rect b="b" l="l" r="r" t="t"/>
+            <a:pathLst>
+              <a:path extrusionOk="0" h="120000" w="120000">
+                <a:moveTo>
+                  <a:pt x="0" y="0"/>
+                </a:moveTo>
+                <a:lnTo>
+                  <a:pt x="120000" y="0"/>
+                </a:lnTo>
+                <a:lnTo>
+                  <a:pt x="120000" y="120000"/>
+                </a:lnTo>
+                <a:lnTo>
+                  <a:pt x="0" y="120000"/>
+                </a:lnTo>
+                <a:close/>
+              </a:path>
+            </a:pathLst>
+          </a:custGeom>
+        </p:spPr>
+      </p:sp>
+      <p:sp>
+        <p:nvSpPr>
+          <p:cNvPr id="334" name="Google Shape;334;gaea034a4cb_0_14:notes"/>
+          <p:cNvSpPr txBox="1"/>
+          <p:nvPr>
+            <p:ph idx="1" type="body"/>
+          </p:nvPr>
+        </p:nvSpPr>
+        <p:spPr>
+          <a:xfrm>
+            <a:off x="685800" y="4343400"/>
+            <a:ext cx="5486400" cy="4114800"/>
+          </a:xfrm>
+          <a:prstGeom prst="rect">
+            <a:avLst/>
+          </a:prstGeom>
+        </p:spPr>
+        <p:txBody>
+          <a:bodyPr anchorCtr="0" anchor="t" bIns="91425" lIns="91425" spcFirstLastPara="1" rIns="91425" wrap="square" tIns="91425">
+            <a:noAutofit/>
+          </a:bodyPr>
+          <a:lstStyle/>
+          <a:p>
+            <a:pPr indent="0" lvl="0" marL="0" rtl="0" algn="l">
+              <a:spcBef>
+                <a:spcPts val="0"/>
+              </a:spcBef>
+              <a:spcAft>
+                <a:spcPts val="0"/>
+              </a:spcAft>
+              <a:buNone/>
+            </a:pPr>
+            <a:r>
+              <a:t/>
+            </a:r>
+            <a:endParaRPr/>
+          </a:p>
+        </p:txBody>
+      </p:sp>
+    </p:spTree>
+  </p:cSld>
+  <p:clrMapOvr>
+    <a:masterClrMapping/>
+  </p:clrMapOvr>
+</p:notes>
+</file>
+
+<file path=ppt/notesSlides/notesSlide12.xml><?xml version="1.0" encoding="utf-8"?>
+<p:notes xmlns:a="http://schemas.openxmlformats.org/drawingml/2006/main" xmlns:r="http://schemas.openxmlformats.org/officeDocument/2006/relationships" xmlns:mc="http://schemas.openxmlformats.org/markup-compatibility/2006" xmlns:mv="urn:schemas-microsoft-com:mac:vml" xmlns:p="http://schemas.openxmlformats.org/presentationml/2006/main" xmlns:c="http://schemas.openxmlformats.org/drawingml/2006/chart" xmlns:dgm="http://schemas.openxmlformats.org/drawingml/2006/diagram" xmlns:o="urn:schemas-microsoft-com:office:office" xmlns:v="urn:schemas-microsoft-com:vml" xmlns:pvml="urn:schemas-microsoft-com:office:powerpoint" xmlns:com="http://schemas.openxmlformats.org/drawingml/2006/compatibility" xmlns:p14="http://schemas.microsoft.com/office/powerpoint/2010/main" xmlns:p15="http://schemas.microsoft.com/office/powerpoint/2012/main" xmlns:ahyp="http://schemas.microsoft.com/office/drawing/2018/hyperlinkcolor" showMasterPhAnim="0" showMasterSp="0">
+  <p:cSld>
+    <p:spTree>
+      <p:nvGrpSpPr>
+        <p:cNvPr id="338" name="Shape 338"/>
+        <p:cNvGrpSpPr/>
+        <p:nvPr/>
+      </p:nvGrpSpPr>
+      <p:grpSpPr>
+        <a:xfrm>
+          <a:off x="0" y="0"/>
+          <a:ext cx="0" cy="0"/>
+          <a:chOff x="0" y="0"/>
+          <a:chExt cx="0" cy="0"/>
+        </a:xfrm>
+      </p:grpSpPr>
+      <p:sp>
+        <p:nvSpPr>
+          <p:cNvPr id="339" name="Google Shape;339;ga8fc67c74e_0_8:notes"/>
+          <p:cNvSpPr/>
+          <p:nvPr>
+            <p:ph idx="2" type="sldImg"/>
+          </p:nvPr>
+        </p:nvSpPr>
+        <p:spPr>
+          <a:xfrm>
+            <a:off x="381300" y="685800"/>
+            <a:ext cx="6096000" cy="3429000"/>
+          </a:xfrm>
+          <a:custGeom>
+            <a:rect b="b" l="l" r="r" t="t"/>
+            <a:pathLst>
+              <a:path extrusionOk="0" h="120000" w="120000">
+                <a:moveTo>
+                  <a:pt x="0" y="0"/>
+                </a:moveTo>
+                <a:lnTo>
+                  <a:pt x="120000" y="0"/>
+                </a:lnTo>
+                <a:lnTo>
+                  <a:pt x="120000" y="120000"/>
+                </a:lnTo>
+                <a:lnTo>
+                  <a:pt x="0" y="120000"/>
+                </a:lnTo>
+                <a:close/>
+              </a:path>
+            </a:pathLst>
+          </a:custGeom>
+        </p:spPr>
+      </p:sp>
+      <p:sp>
+        <p:nvSpPr>
+          <p:cNvPr id="340" name="Google Shape;340;ga8fc67c74e_0_8:notes"/>
           <p:cNvSpPr txBox="1"/>
           <p:nvPr>
             <p:ph idx="1" type="body"/>
@@ -1421,7 +1621,7 @@
       </p:grpSpPr>
       <p:sp>
         <p:nvSpPr>
-          <p:cNvPr id="308" name="Google Shape;308;ga89d943cba_1_10:notes"/>
+          <p:cNvPr id="308" name="Google Shape;308;ga8fc67c74e_0_0:notes"/>
           <p:cNvSpPr/>
           <p:nvPr>
             <p:ph idx="2" type="sldImg"/>
@@ -1456,7 +1656,7 @@
       </p:sp>
       <p:sp>
         <p:nvSpPr>
-          <p:cNvPr id="309" name="Google Shape;309;ga89d943cba_1_10:notes"/>
+          <p:cNvPr id="309" name="Google Shape;309;ga8fc67c74e_0_0:notes"/>
           <p:cNvSpPr txBox="1"/>
           <p:nvPr>
             <p:ph idx="1" type="body"/>
@@ -1520,7 +1720,7 @@
       </p:grpSpPr>
       <p:sp>
         <p:nvSpPr>
-          <p:cNvPr id="314" name="Google Shape;314;ga89d943cba_1_15:notes"/>
+          <p:cNvPr id="314" name="Google Shape;314;ga89d943cba_1_10:notes"/>
           <p:cNvSpPr/>
           <p:nvPr>
             <p:ph idx="2" type="sldImg"/>
@@ -1555,7 +1755,7 @@
       </p:sp>
       <p:sp>
         <p:nvSpPr>
-          <p:cNvPr id="315" name="Google Shape;315;ga89d943cba_1_15:notes"/>
+          <p:cNvPr id="315" name="Google Shape;315;ga89d943cba_1_10:notes"/>
           <p:cNvSpPr txBox="1"/>
           <p:nvPr>
             <p:ph idx="1" type="body"/>
@@ -1619,7 +1819,7 @@
       </p:grpSpPr>
       <p:sp>
         <p:nvSpPr>
-          <p:cNvPr id="320" name="Google Shape;320;ga89d943cba_1_20:notes"/>
+          <p:cNvPr id="320" name="Google Shape;320;ga89d943cba_1_15:notes"/>
           <p:cNvSpPr/>
           <p:nvPr>
             <p:ph idx="2" type="sldImg"/>
@@ -1654,7 +1854,7 @@
       </p:sp>
       <p:sp>
         <p:nvSpPr>
-          <p:cNvPr id="321" name="Google Shape;321;ga89d943cba_1_20:notes"/>
+          <p:cNvPr id="321" name="Google Shape;321;ga89d943cba_1_15:notes"/>
           <p:cNvSpPr txBox="1"/>
           <p:nvPr>
             <p:ph idx="1" type="body"/>
@@ -16080,7 +16280,7 @@
   <p:cSld>
     <p:spTree>
       <p:nvGrpSpPr>
-        <p:cNvPr id="329" name="Shape 329"/>
+        <p:cNvPr id="328" name="Shape 328"/>
         <p:cNvGrpSpPr/>
         <p:nvPr/>
       </p:nvGrpSpPr>
@@ -16094,7 +16294,7 @@
       </p:grpSpPr>
       <p:sp>
         <p:nvSpPr>
-          <p:cNvPr id="330" name="Google Shape;330;p22"/>
+          <p:cNvPr id="329" name="Google Shape;329;p22"/>
           <p:cNvSpPr txBox="1"/>
           <p:nvPr>
             <p:ph type="title"/>
@@ -16126,6 +16326,127 @@
             </a:pPr>
             <a:r>
               <a:rPr lang="en"/>
+              <a:t>Standardization and computing the covariance matrix</a:t>
+            </a:r>
+            <a:endParaRPr/>
+          </a:p>
+        </p:txBody>
+      </p:sp>
+      <p:pic>
+        <p:nvPicPr>
+          <p:cNvPr id="330" name="Google Shape;330;p22"/>
+          <p:cNvPicPr preferRelativeResize="0"/>
+          <p:nvPr/>
+        </p:nvPicPr>
+        <p:blipFill>
+          <a:blip r:embed="rId3">
+            <a:alphaModFix/>
+          </a:blip>
+          <a:stretch>
+            <a:fillRect/>
+          </a:stretch>
+        </p:blipFill>
+        <p:spPr>
+          <a:xfrm>
+            <a:off x="1303800" y="3242250"/>
+            <a:ext cx="5760875" cy="1333800"/>
+          </a:xfrm>
+          <a:prstGeom prst="rect">
+            <a:avLst/>
+          </a:prstGeom>
+          <a:noFill/>
+          <a:ln>
+            <a:noFill/>
+          </a:ln>
+        </p:spPr>
+      </p:pic>
+      <p:pic>
+        <p:nvPicPr>
+          <p:cNvPr id="331" name="Google Shape;331;p22"/>
+          <p:cNvPicPr preferRelativeResize="0"/>
+          <p:nvPr/>
+        </p:nvPicPr>
+        <p:blipFill>
+          <a:blip r:embed="rId4">
+            <a:alphaModFix/>
+          </a:blip>
+          <a:stretch>
+            <a:fillRect/>
+          </a:stretch>
+        </p:blipFill>
+        <p:spPr>
+          <a:xfrm>
+            <a:off x="1303800" y="1834825"/>
+            <a:ext cx="4000878" cy="821475"/>
+          </a:xfrm>
+          <a:prstGeom prst="rect">
+            <a:avLst/>
+          </a:prstGeom>
+          <a:noFill/>
+          <a:ln>
+            <a:noFill/>
+          </a:ln>
+        </p:spPr>
+      </p:pic>
+    </p:spTree>
+  </p:cSld>
+  <p:clrMapOvr>
+    <a:masterClrMapping/>
+  </p:clrMapOvr>
+</p:sld>
+</file>
+
+<file path=ppt/slides/slide11.xml><?xml version="1.0" encoding="utf-8"?>
+<p:sld xmlns:a="http://schemas.openxmlformats.org/drawingml/2006/main" xmlns:r="http://schemas.openxmlformats.org/officeDocument/2006/relationships" xmlns:mc="http://schemas.openxmlformats.org/markup-compatibility/2006" xmlns:mv="urn:schemas-microsoft-com:mac:vml" xmlns:p="http://schemas.openxmlformats.org/presentationml/2006/main" xmlns:c="http://schemas.openxmlformats.org/drawingml/2006/chart" xmlns:dgm="http://schemas.openxmlformats.org/drawingml/2006/diagram" xmlns:o="urn:schemas-microsoft-com:office:office" xmlns:v="urn:schemas-microsoft-com:vml" xmlns:pvml="urn:schemas-microsoft-com:office:powerpoint" xmlns:com="http://schemas.openxmlformats.org/drawingml/2006/compatibility" xmlns:p14="http://schemas.microsoft.com/office/powerpoint/2010/main" xmlns:p15="http://schemas.microsoft.com/office/powerpoint/2012/main" xmlns:ahyp="http://schemas.microsoft.com/office/drawing/2018/hyperlinkcolor">
+  <p:cSld>
+    <p:spTree>
+      <p:nvGrpSpPr>
+        <p:cNvPr id="335" name="Shape 335"/>
+        <p:cNvGrpSpPr/>
+        <p:nvPr/>
+      </p:nvGrpSpPr>
+      <p:grpSpPr>
+        <a:xfrm>
+          <a:off x="0" y="0"/>
+          <a:ext cx="0" cy="0"/>
+          <a:chOff x="0" y="0"/>
+          <a:chExt cx="0" cy="0"/>
+        </a:xfrm>
+      </p:grpSpPr>
+      <p:sp>
+        <p:nvSpPr>
+          <p:cNvPr id="336" name="Google Shape;336;p23"/>
+          <p:cNvSpPr txBox="1"/>
+          <p:nvPr>
+            <p:ph type="title"/>
+          </p:nvPr>
+        </p:nvSpPr>
+        <p:spPr>
+          <a:xfrm>
+            <a:off x="1303800" y="598575"/>
+            <a:ext cx="7030500" cy="999300"/>
+          </a:xfrm>
+          <a:prstGeom prst="rect">
+            <a:avLst/>
+          </a:prstGeom>
+        </p:spPr>
+        <p:txBody>
+          <a:bodyPr anchorCtr="0" anchor="t" bIns="91425" lIns="91425" spcFirstLastPara="1" rIns="91425" wrap="square" tIns="91425">
+            <a:noAutofit/>
+          </a:bodyPr>
+          <a:lstStyle/>
+          <a:p>
+            <a:pPr indent="0" lvl="0" marL="0" rtl="0" algn="l">
+              <a:spcBef>
+                <a:spcPts val="0"/>
+              </a:spcBef>
+              <a:spcAft>
+                <a:spcPts val="0"/>
+              </a:spcAft>
+              <a:buNone/>
+            </a:pPr>
+            <a:r>
+              <a:rPr lang="en"/>
               <a:t>Applications</a:t>
             </a:r>
             <a:endParaRPr/>
@@ -16134,7 +16455,7 @@
       </p:sp>
       <p:sp>
         <p:nvSpPr>
-          <p:cNvPr id="331" name="Google Shape;331;p22"/>
+          <p:cNvPr id="337" name="Google Shape;337;p23"/>
           <p:cNvSpPr txBox="1"/>
           <p:nvPr>
             <p:ph idx="1" type="body"/>
@@ -16333,6 +16654,223 @@
               <a:t>pattern recognition and time series prediction.</a:t>
             </a:r>
             <a:endParaRPr/>
+          </a:p>
+        </p:txBody>
+      </p:sp>
+    </p:spTree>
+  </p:cSld>
+  <p:clrMapOvr>
+    <a:masterClrMapping/>
+  </p:clrMapOvr>
+</p:sld>
+</file>
+
+<file path=ppt/slides/slide12.xml><?xml version="1.0" encoding="utf-8"?>
+<p:sld xmlns:a="http://schemas.openxmlformats.org/drawingml/2006/main" xmlns:r="http://schemas.openxmlformats.org/officeDocument/2006/relationships" xmlns:mc="http://schemas.openxmlformats.org/markup-compatibility/2006" xmlns:mv="urn:schemas-microsoft-com:mac:vml" xmlns:p="http://schemas.openxmlformats.org/presentationml/2006/main" xmlns:c="http://schemas.openxmlformats.org/drawingml/2006/chart" xmlns:dgm="http://schemas.openxmlformats.org/drawingml/2006/diagram" xmlns:o="urn:schemas-microsoft-com:office:office" xmlns:v="urn:schemas-microsoft-com:vml" xmlns:pvml="urn:schemas-microsoft-com:office:powerpoint" xmlns:com="http://schemas.openxmlformats.org/drawingml/2006/compatibility" xmlns:p14="http://schemas.microsoft.com/office/powerpoint/2010/main" xmlns:p15="http://schemas.microsoft.com/office/powerpoint/2012/main" xmlns:ahyp="http://schemas.microsoft.com/office/drawing/2018/hyperlinkcolor">
+  <p:cSld>
+    <p:spTree>
+      <p:nvGrpSpPr>
+        <p:cNvPr id="341" name="Shape 341"/>
+        <p:cNvGrpSpPr/>
+        <p:nvPr/>
+      </p:nvGrpSpPr>
+      <p:grpSpPr>
+        <a:xfrm>
+          <a:off x="0" y="0"/>
+          <a:ext cx="0" cy="0"/>
+          <a:chOff x="0" y="0"/>
+          <a:chExt cx="0" cy="0"/>
+        </a:xfrm>
+      </p:grpSpPr>
+      <p:sp>
+        <p:nvSpPr>
+          <p:cNvPr id="342" name="Google Shape;342;p24"/>
+          <p:cNvSpPr txBox="1"/>
+          <p:nvPr>
+            <p:ph type="title"/>
+          </p:nvPr>
+        </p:nvSpPr>
+        <p:spPr>
+          <a:xfrm>
+            <a:off x="1303800" y="598575"/>
+            <a:ext cx="7030500" cy="999300"/>
+          </a:xfrm>
+          <a:prstGeom prst="rect">
+            <a:avLst/>
+          </a:prstGeom>
+        </p:spPr>
+        <p:txBody>
+          <a:bodyPr anchorCtr="0" anchor="t" bIns="91425" lIns="91425" spcFirstLastPara="1" rIns="91425" wrap="square" tIns="91425">
+            <a:noAutofit/>
+          </a:bodyPr>
+          <a:lstStyle/>
+          <a:p>
+            <a:pPr indent="0" lvl="0" marL="0" rtl="0" algn="l">
+              <a:spcBef>
+                <a:spcPts val="0"/>
+              </a:spcBef>
+              <a:spcAft>
+                <a:spcPts val="0"/>
+              </a:spcAft>
+              <a:buNone/>
+            </a:pPr>
+            <a:r>
+              <a:rPr lang="en"/>
+              <a:t>Application Example</a:t>
+            </a:r>
+            <a:endParaRPr/>
+          </a:p>
+        </p:txBody>
+      </p:sp>
+      <p:sp>
+        <p:nvSpPr>
+          <p:cNvPr id="343" name="Google Shape;343;p24"/>
+          <p:cNvSpPr txBox="1"/>
+          <p:nvPr>
+            <p:ph idx="1" type="body"/>
+          </p:nvPr>
+        </p:nvSpPr>
+        <p:spPr>
+          <a:xfrm>
+            <a:off x="751550" y="1597875"/>
+            <a:ext cx="7582800" cy="2933700"/>
+          </a:xfrm>
+          <a:prstGeom prst="rect">
+            <a:avLst/>
+          </a:prstGeom>
+        </p:spPr>
+        <p:txBody>
+          <a:bodyPr anchorCtr="0" anchor="t" bIns="91425" lIns="91425" spcFirstLastPara="1" rIns="91425" wrap="square" tIns="91425">
+            <a:noAutofit/>
+          </a:bodyPr>
+          <a:lstStyle/>
+          <a:p>
+            <a:pPr indent="0" lvl="0" marL="0" rtl="0" algn="l">
+              <a:spcBef>
+                <a:spcPts val="0"/>
+              </a:spcBef>
+              <a:spcAft>
+                <a:spcPts val="0"/>
+              </a:spcAft>
+              <a:buNone/>
+            </a:pPr>
+            <a:r>
+              <a:rPr lang="en" sz="1400">
+                <a:solidFill>
+                  <a:srgbClr val="000000"/>
+                </a:solidFill>
+                <a:latin typeface="Arial"/>
+                <a:ea typeface="Arial"/>
+                <a:cs typeface="Arial"/>
+                <a:sym typeface="Arial"/>
+              </a:rPr>
+              <a:t>As a technique, PCA is widely applicable in several fields. </a:t>
+            </a:r>
+            <a:endParaRPr sz="1400">
+              <a:solidFill>
+                <a:srgbClr val="000000"/>
+              </a:solidFill>
+              <a:latin typeface="Arial"/>
+              <a:ea typeface="Arial"/>
+              <a:cs typeface="Arial"/>
+              <a:sym typeface="Arial"/>
+            </a:endParaRPr>
+          </a:p>
+          <a:p>
+            <a:pPr indent="0" lvl="0" marL="0" rtl="0" algn="l">
+              <a:spcBef>
+                <a:spcPts val="1600"/>
+              </a:spcBef>
+              <a:spcAft>
+                <a:spcPts val="0"/>
+              </a:spcAft>
+              <a:buNone/>
+            </a:pPr>
+            <a:r>
+              <a:rPr lang="en" sz="1400">
+                <a:solidFill>
+                  <a:srgbClr val="000000"/>
+                </a:solidFill>
+                <a:latin typeface="Arial"/>
+                <a:ea typeface="Arial"/>
+                <a:cs typeface="Arial"/>
+                <a:sym typeface="Arial"/>
+              </a:rPr>
+              <a:t>For example, principal components are highly valuable in the prediction of stock prices and financial risk analysis, using variables like earnings yield and book to market ratio. </a:t>
+            </a:r>
+            <a:endParaRPr sz="1400">
+              <a:solidFill>
+                <a:srgbClr val="000000"/>
+              </a:solidFill>
+              <a:latin typeface="Arial"/>
+              <a:ea typeface="Arial"/>
+              <a:cs typeface="Arial"/>
+              <a:sym typeface="Arial"/>
+            </a:endParaRPr>
+          </a:p>
+          <a:p>
+            <a:pPr indent="0" lvl="0" marL="0" rtl="0" algn="l">
+              <a:spcBef>
+                <a:spcPts val="1600"/>
+              </a:spcBef>
+              <a:spcAft>
+                <a:spcPts val="0"/>
+              </a:spcAft>
+              <a:buNone/>
+            </a:pPr>
+            <a:r>
+              <a:rPr lang="en" sz="1400">
+                <a:solidFill>
+                  <a:srgbClr val="000000"/>
+                </a:solidFill>
+                <a:latin typeface="Arial"/>
+                <a:ea typeface="Arial"/>
+                <a:cs typeface="Arial"/>
+                <a:sym typeface="Arial"/>
+              </a:rPr>
+              <a:t>PCA is especially useful in image analysis. </a:t>
+            </a:r>
+            <a:endParaRPr sz="1400">
+              <a:solidFill>
+                <a:srgbClr val="000000"/>
+              </a:solidFill>
+              <a:latin typeface="Arial"/>
+              <a:ea typeface="Arial"/>
+              <a:cs typeface="Arial"/>
+              <a:sym typeface="Arial"/>
+            </a:endParaRPr>
+          </a:p>
+          <a:p>
+            <a:pPr indent="0" lvl="0" marL="0" rtl="0" algn="l">
+              <a:spcBef>
+                <a:spcPts val="1600"/>
+              </a:spcBef>
+              <a:spcAft>
+                <a:spcPts val="1600"/>
+              </a:spcAft>
+              <a:buNone/>
+            </a:pPr>
+            <a:r>
+              <a:rPr lang="en" sz="1400">
+                <a:solidFill>
+                  <a:srgbClr val="000000"/>
+                </a:solidFill>
+                <a:latin typeface="Arial"/>
+                <a:ea typeface="Arial"/>
+                <a:cs typeface="Arial"/>
+                <a:sym typeface="Arial"/>
+              </a:rPr>
+              <a:t>Often, images of the same object will be taken multiple times under different lighting (i.e, green light, infrared, ultraviolet) which may lead to different features about the object being clearly captured in each image. PCA relies on the redundancy between these images as a reference to help obtain a final clear image. The first few principal components will yield the most accurate pictures, and subsequent principal components yield pictures that are progressively less defined.</a:t>
+            </a:r>
+            <a:endParaRPr sz="1200">
+              <a:solidFill>
+                <a:srgbClr val="000000"/>
+              </a:solidFill>
+              <a:latin typeface="Arial"/>
+              <a:ea typeface="Arial"/>
+              <a:cs typeface="Arial"/>
+              <a:sym typeface="Arial"/>
+            </a:endParaRPr>
           </a:p>
         </p:txBody>
       </p:sp>
@@ -16964,7 +17502,7 @@
             </a:pPr>
             <a:r>
               <a:rPr lang="en"/>
-              <a:t>Applications</a:t>
+              <a:t>Application Example</a:t>
             </a:r>
             <a:endParaRPr/>
           </a:p>
@@ -16980,8 +17518,8 @@
         </p:nvSpPr>
         <p:spPr>
           <a:xfrm>
-            <a:off x="1303800" y="1493725"/>
-            <a:ext cx="7030500" cy="3037800"/>
+            <a:off x="751550" y="1597875"/>
+            <a:ext cx="7582800" cy="2933700"/>
           </a:xfrm>
           <a:prstGeom prst="rect">
             <a:avLst/>
@@ -17003,139 +17541,50 @@
               <a:buNone/>
             </a:pPr>
             <a:r>
-              <a:rPr lang="en" sz="1600"/>
-              <a:t>Some applications of the SVD:</a:t>
+              <a:rPr lang="en" sz="1400">
+                <a:solidFill>
+                  <a:srgbClr val="000000"/>
+                </a:solidFill>
+                <a:latin typeface="Arial"/>
+                <a:ea typeface="Arial"/>
+                <a:cs typeface="Arial"/>
+                <a:sym typeface="Arial"/>
+              </a:rPr>
+              <a:t>Example (Netflix):</a:t>
             </a:r>
-            <a:endParaRPr sz="1600"/>
-          </a:p>
-          <a:p>
-            <a:pPr indent="-330200" lvl="0" marL="457200" rtl="0" algn="l">
-              <a:spcBef>
-                <a:spcPts val="1600"/>
-              </a:spcBef>
-              <a:spcAft>
-                <a:spcPts val="0"/>
-              </a:spcAft>
-              <a:buSzPts val="1600"/>
-              <a:buChar char="●"/>
-            </a:pPr>
             <a:r>
-              <a:rPr lang="en" sz="1600"/>
-              <a:t>Computing the pseudoinverse of a matrix</a:t>
+              <a:rPr baseline="30000" lang="en" sz="1400">
+                <a:solidFill>
+                  <a:srgbClr val="000000"/>
+                </a:solidFill>
+                <a:latin typeface="Arial"/>
+                <a:ea typeface="Arial"/>
+                <a:cs typeface="Arial"/>
+                <a:sym typeface="Arial"/>
+              </a:rPr>
+              <a:t>1</a:t>
             </a:r>
-            <a:endParaRPr sz="1600"/>
-          </a:p>
-          <a:p>
-            <a:pPr indent="-330200" lvl="0" marL="457200" rtl="0" algn="l">
-              <a:spcBef>
-                <a:spcPts val="0"/>
-              </a:spcBef>
-              <a:spcAft>
-                <a:spcPts val="0"/>
-              </a:spcAft>
-              <a:buSzPts val="1600"/>
-              <a:buChar char="●"/>
-            </a:pPr>
             <a:r>
-              <a:rPr lang="en" sz="1600"/>
-              <a:t>matrix approximation</a:t>
+              <a:rPr lang="en" sz="1400">
+                <a:solidFill>
+                  <a:srgbClr val="000000"/>
+                </a:solidFill>
+                <a:latin typeface="Arial"/>
+                <a:ea typeface="Arial"/>
+                <a:cs typeface="Arial"/>
+                <a:sym typeface="Arial"/>
+              </a:rPr>
+              <a:t> Suppose we have a m × n matrix that contains the ratings of m viewers for n movies. A truncated SVD as suggested above not only saves memory; it also gives insight into the preferences of each viewer. For example we can interpret each rank-1 matrix σi~ui~vT i to be due to a particular attribute, e.g., comedy, action, sci-fi, or romance content. Then σi determines how strongly the ratings depend on the i th attribute, the entries of ~vT i score each movie with respect to this attribute, and the entries of ~ui evaluate how much each viewer cares about this particular attribute. Then truncating the SVD as in (8) amounts to identifying a few key attributes that underlie the ratings. This is useful, for example, in making movie recommendations.</a:t>
             </a:r>
-            <a:endParaRPr sz="1600"/>
-          </a:p>
-          <a:p>
-            <a:pPr indent="-330200" lvl="0" marL="457200" rtl="0" algn="l">
-              <a:spcBef>
-                <a:spcPts val="0"/>
-              </a:spcBef>
-              <a:spcAft>
-                <a:spcPts val="0"/>
-              </a:spcAft>
-              <a:buSzPts val="1600"/>
-              <a:buChar char="●"/>
-            </a:pPr>
-            <a:r>
-              <a:rPr lang="en" sz="1600"/>
-              <a:t>determining the rank, range and null space of a matrix.</a:t>
-            </a:r>
-            <a:endParaRPr sz="1600"/>
-          </a:p>
-          <a:p>
-            <a:pPr indent="-317500" lvl="0" marL="457200" rtl="0" algn="l">
-              <a:spcBef>
-                <a:spcPts val="0"/>
-              </a:spcBef>
-              <a:spcAft>
-                <a:spcPts val="0"/>
-              </a:spcAft>
-              <a:buClr>
+            <a:endParaRPr sz="1400">
+              <a:solidFill>
                 <a:srgbClr val="000000"/>
-              </a:buClr>
-              <a:buSzPts val="1400"/>
-              <a:buFont typeface="Arial"/>
-              <a:buChar char="●"/>
-            </a:pPr>
-            <a:r>
-              <a:rPr lang="en" sz="1600"/>
-              <a:t>separable models.</a:t>
-            </a:r>
-            <a:endParaRPr sz="1600"/>
-          </a:p>
-          <a:p>
-            <a:pPr indent="-317500" lvl="0" marL="457200" rtl="0" algn="l">
-              <a:spcBef>
-                <a:spcPts val="0"/>
-              </a:spcBef>
-              <a:spcAft>
-                <a:spcPts val="0"/>
-              </a:spcAft>
-              <a:buClr>
-                <a:srgbClr val="000000"/>
-              </a:buClr>
-              <a:buSzPts val="1400"/>
-              <a:buFont typeface="Arial"/>
-              <a:buChar char="●"/>
-            </a:pPr>
-            <a:r>
-              <a:rPr lang="en" sz="1600"/>
-              <a:t>nearest orthogonal matrix.</a:t>
-            </a:r>
-            <a:endParaRPr sz="1600"/>
-          </a:p>
-          <a:p>
-            <a:pPr indent="-317500" lvl="0" marL="457200" rtl="0" algn="l">
-              <a:spcBef>
-                <a:spcPts val="0"/>
-              </a:spcBef>
-              <a:spcAft>
-                <a:spcPts val="0"/>
-              </a:spcAft>
-              <a:buClr>
-                <a:srgbClr val="000000"/>
-              </a:buClr>
-              <a:buSzPts val="1400"/>
-              <a:buFont typeface="Arial"/>
-              <a:buChar char="●"/>
-            </a:pPr>
-            <a:r>
-              <a:rPr lang="en" sz="1600"/>
-              <a:t>Kabsch algorithm (calculating the optimal rotation matrix that minimizes the root mean squared deviation between two paired sets of points)</a:t>
-            </a:r>
-            <a:endParaRPr sz="1600"/>
-          </a:p>
-          <a:p>
-            <a:pPr indent="0" lvl="0" marL="457200" rtl="0" algn="l">
-              <a:spcBef>
-                <a:spcPts val="1200"/>
-              </a:spcBef>
-              <a:spcAft>
-                <a:spcPts val="0"/>
-              </a:spcAft>
-              <a:buNone/>
-            </a:pPr>
-            <a:r>
-              <a:t/>
-            </a:r>
-            <a:endParaRPr/>
+              </a:solidFill>
+              <a:latin typeface="Arial"/>
+              <a:ea typeface="Arial"/>
+              <a:cs typeface="Arial"/>
+              <a:sym typeface="Arial"/>
+            </a:endParaRPr>
           </a:p>
           <a:p>
             <a:pPr indent="0" lvl="0" marL="0" rtl="0" algn="l">
@@ -17143,44 +17592,43 @@
                 <a:spcPts val="1600"/>
               </a:spcBef>
               <a:spcAft>
-                <a:spcPts val="0"/>
+                <a:spcPts val="1600"/>
               </a:spcAft>
               <a:buNone/>
             </a:pPr>
             <a:r>
-              <a:t/>
+              <a:rPr baseline="30000" lang="en" sz="1400">
+                <a:solidFill>
+                  <a:srgbClr val="000000"/>
+                </a:solidFill>
+                <a:latin typeface="Arial"/>
+                <a:ea typeface="Arial"/>
+                <a:cs typeface="Arial"/>
+                <a:sym typeface="Arial"/>
+              </a:rPr>
+              <a:t>1</a:t>
             </a:r>
-            <a:endParaRPr/>
-          </a:p>
-          <a:p>
-            <a:pPr indent="0" lvl="0" marL="0" rtl="0" algn="l">
-              <a:spcBef>
-                <a:spcPts val="1600"/>
-              </a:spcBef>
-              <a:spcAft>
-                <a:spcPts val="0"/>
-              </a:spcAft>
-              <a:buNone/>
-            </a:pPr>
             <a:r>
-              <a:t/>
+              <a:rPr lang="en" sz="1200">
+                <a:solidFill>
+                  <a:srgbClr val="000000"/>
+                </a:solidFill>
+                <a:latin typeface="Arial"/>
+                <a:ea typeface="Arial"/>
+                <a:cs typeface="Arial"/>
+                <a:sym typeface="Arial"/>
+              </a:rPr>
+              <a:t>The material from this section was adapted from the EE16B 2017 course reader, Copyright © 2017 Murat Arcak and licensed under a Creative Commons Attribution-NonCommercialShareAlike 4.0 International License.</a:t>
             </a:r>
-            <a:endParaRPr/>
-          </a:p>
-          <a:p>
-            <a:pPr indent="0" lvl="0" marL="0" rtl="0" algn="l">
-              <a:spcBef>
-                <a:spcPts val="1600"/>
-              </a:spcBef>
-              <a:spcAft>
-                <a:spcPts val="1600"/>
-              </a:spcAft>
-              <a:buNone/>
-            </a:pPr>
-            <a:r>
-              <a:t/>
-            </a:r>
-            <a:endParaRPr/>
+            <a:endParaRPr sz="1200">
+              <a:solidFill>
+                <a:srgbClr val="000000"/>
+              </a:solidFill>
+              <a:latin typeface="Arial"/>
+              <a:ea typeface="Arial"/>
+              <a:cs typeface="Arial"/>
+              <a:sym typeface="Arial"/>
+            </a:endParaRPr>
           </a:p>
         </p:txBody>
       </p:sp>
@@ -17243,7 +17691,7 @@
             </a:pPr>
             <a:r>
               <a:rPr lang="en"/>
-              <a:t>PCA</a:t>
+              <a:t>Applications</a:t>
             </a:r>
             <a:endParaRPr/>
           </a:p>
@@ -17259,8 +17707,8 @@
         </p:nvSpPr>
         <p:spPr>
           <a:xfrm>
-            <a:off x="1303800" y="1409175"/>
-            <a:ext cx="7030500" cy="3150600"/>
+            <a:off x="1303800" y="1493725"/>
+            <a:ext cx="7030500" cy="3037800"/>
           </a:xfrm>
           <a:prstGeom prst="rect">
             <a:avLst/>
@@ -17272,9 +17720,25 @@
           </a:bodyPr>
           <a:lstStyle/>
           <a:p>
+            <a:pPr indent="0" lvl="0" marL="0" rtl="0" algn="l">
+              <a:spcBef>
+                <a:spcPts val="0"/>
+              </a:spcBef>
+              <a:spcAft>
+                <a:spcPts val="0"/>
+              </a:spcAft>
+              <a:buNone/>
+            </a:pPr>
+            <a:r>
+              <a:rPr lang="en" sz="1600"/>
+              <a:t>Some applications of the SVD:</a:t>
+            </a:r>
+            <a:endParaRPr sz="1600"/>
+          </a:p>
+          <a:p>
             <a:pPr indent="-330200" lvl="0" marL="457200" rtl="0" algn="l">
               <a:spcBef>
-                <a:spcPts val="0"/>
+                <a:spcPts val="1600"/>
               </a:spcBef>
               <a:spcAft>
                 <a:spcPts val="0"/>
@@ -17284,7 +17748,7 @@
             </a:pPr>
             <a:r>
               <a:rPr lang="en" sz="1600"/>
-              <a:t>dimensionality-reduction method: for analysis, it is often necessary to reduce the dimensionality of large data sets</a:t>
+              <a:t>Computing the pseudoinverse of a matrix</a:t>
             </a:r>
             <a:endParaRPr sz="1600"/>
           </a:p>
@@ -17301,7 +17765,7 @@
             </a:pPr>
             <a:r>
               <a:rPr lang="en" sz="1600"/>
-              <a:t>transforming a large set of variables into a smaller one that still contains most of the information in the large set.</a:t>
+              <a:t>matrix approximation</a:t>
             </a:r>
             <a:endParaRPr sz="1600"/>
           </a:p>
@@ -17318,43 +17782,132 @@
             </a:pPr>
             <a:r>
               <a:rPr lang="en" sz="1600"/>
-              <a:t>small loss of accuracy, but the aim is to achieve a simpler dataset by preserving as much information as possible. </a:t>
+              <a:t>determining the rank, range and null space of a matrix.</a:t>
             </a:r>
             <a:endParaRPr sz="1600"/>
           </a:p>
           <a:p>
-            <a:pPr indent="-330200" lvl="0" marL="457200" rtl="0" algn="l">
-              <a:spcBef>
-                <a:spcPts val="0"/>
-              </a:spcBef>
-              <a:spcAft>
-                <a:spcPts val="0"/>
-              </a:spcAft>
-              <a:buSzPts val="1600"/>
+            <a:pPr indent="-317500" lvl="0" marL="457200" rtl="0" algn="l">
+              <a:spcBef>
+                <a:spcPts val="0"/>
+              </a:spcBef>
+              <a:spcAft>
+                <a:spcPts val="0"/>
+              </a:spcAft>
+              <a:buClr>
+                <a:srgbClr val="000000"/>
+              </a:buClr>
+              <a:buSzPts val="1400"/>
+              <a:buFont typeface="Arial"/>
               <a:buChar char="●"/>
             </a:pPr>
             <a:r>
               <a:rPr lang="en" sz="1600"/>
-              <a:t>Steps: standardization, covariance matrix computation, and identify principal components by computing the eigenvalues of the covariance matrix.</a:t>
+              <a:t>separable models.</a:t>
             </a:r>
             <a:endParaRPr sz="1600"/>
           </a:p>
           <a:p>
-            <a:pPr indent="-330200" lvl="0" marL="457200" rtl="0" algn="l">
-              <a:spcBef>
-                <a:spcPts val="0"/>
-              </a:spcBef>
-              <a:spcAft>
-                <a:spcPts val="0"/>
-              </a:spcAft>
-              <a:buSzPts val="1600"/>
+            <a:pPr indent="-317500" lvl="0" marL="457200" rtl="0" algn="l">
+              <a:spcBef>
+                <a:spcPts val="0"/>
+              </a:spcBef>
+              <a:spcAft>
+                <a:spcPts val="0"/>
+              </a:spcAft>
+              <a:buClr>
+                <a:srgbClr val="000000"/>
+              </a:buClr>
+              <a:buSzPts val="1400"/>
+              <a:buFont typeface="Arial"/>
               <a:buChar char="●"/>
             </a:pPr>
             <a:r>
               <a:rPr lang="en" sz="1600"/>
-              <a:t>For standardization: subtract the mean and divide by the standard deviation for each value of each variable.</a:t>
+              <a:t>nearest orthogonal matrix.</a:t>
             </a:r>
             <a:endParaRPr sz="1600"/>
+          </a:p>
+          <a:p>
+            <a:pPr indent="-317500" lvl="0" marL="457200" rtl="0" algn="l">
+              <a:spcBef>
+                <a:spcPts val="0"/>
+              </a:spcBef>
+              <a:spcAft>
+                <a:spcPts val="0"/>
+              </a:spcAft>
+              <a:buClr>
+                <a:srgbClr val="000000"/>
+              </a:buClr>
+              <a:buSzPts val="1400"/>
+              <a:buFont typeface="Arial"/>
+              <a:buChar char="●"/>
+            </a:pPr>
+            <a:r>
+              <a:rPr lang="en" sz="1600"/>
+              <a:t>Kabsch algorithm (calculating the optimal rotation matrix that minimizes the root mean squared deviation between two paired sets of points)</a:t>
+            </a:r>
+            <a:endParaRPr sz="1600"/>
+          </a:p>
+          <a:p>
+            <a:pPr indent="0" lvl="0" marL="457200" rtl="0" algn="l">
+              <a:spcBef>
+                <a:spcPts val="1200"/>
+              </a:spcBef>
+              <a:spcAft>
+                <a:spcPts val="0"/>
+              </a:spcAft>
+              <a:buNone/>
+            </a:pPr>
+            <a:r>
+              <a:t/>
+            </a:r>
+            <a:endParaRPr/>
+          </a:p>
+          <a:p>
+            <a:pPr indent="0" lvl="0" marL="0" rtl="0" algn="l">
+              <a:spcBef>
+                <a:spcPts val="1600"/>
+              </a:spcBef>
+              <a:spcAft>
+                <a:spcPts val="0"/>
+              </a:spcAft>
+              <a:buNone/>
+            </a:pPr>
+            <a:r>
+              <a:t/>
+            </a:r>
+            <a:endParaRPr/>
+          </a:p>
+          <a:p>
+            <a:pPr indent="0" lvl="0" marL="0" rtl="0" algn="l">
+              <a:spcBef>
+                <a:spcPts val="1600"/>
+              </a:spcBef>
+              <a:spcAft>
+                <a:spcPts val="0"/>
+              </a:spcAft>
+              <a:buNone/>
+            </a:pPr>
+            <a:r>
+              <a:t/>
+            </a:r>
+            <a:endParaRPr/>
+          </a:p>
+          <a:p>
+            <a:pPr indent="0" lvl="0" marL="0" rtl="0" algn="l">
+              <a:spcBef>
+                <a:spcPts val="1600"/>
+              </a:spcBef>
+              <a:spcAft>
+                <a:spcPts val="1600"/>
+              </a:spcAft>
+              <a:buNone/>
+            </a:pPr>
+            <a:r>
+              <a:t/>
+            </a:r>
+            <a:endParaRPr/>
           </a:p>
         </p:txBody>
       </p:sp>
@@ -17417,68 +17970,121 @@
             </a:pPr>
             <a:r>
               <a:rPr lang="en"/>
-              <a:t>Standardization and computing the covariance matrix</a:t>
+              <a:t>PCA</a:t>
             </a:r>
             <a:endParaRPr/>
           </a:p>
         </p:txBody>
       </p:sp>
-      <p:pic>
-        <p:nvPicPr>
+      <p:sp>
+        <p:nvSpPr>
           <p:cNvPr id="324" name="Google Shape;324;p21"/>
-          <p:cNvPicPr preferRelativeResize="0"/>
-          <p:nvPr/>
-        </p:nvPicPr>
-        <p:blipFill>
-          <a:blip r:embed="rId3">
-            <a:alphaModFix/>
-          </a:blip>
-          <a:stretch>
-            <a:fillRect/>
-          </a:stretch>
-        </p:blipFill>
+          <p:cNvSpPr txBox="1"/>
+          <p:nvPr>
+            <p:ph idx="1" type="body"/>
+          </p:nvPr>
+        </p:nvSpPr>
         <p:spPr>
           <a:xfrm>
-            <a:off x="1303800" y="3242250"/>
-            <a:ext cx="5760875" cy="1333800"/>
+            <a:off x="1303800" y="1409175"/>
+            <a:ext cx="7030500" cy="3150600"/>
           </a:xfrm>
           <a:prstGeom prst="rect">
             <a:avLst/>
           </a:prstGeom>
-          <a:noFill/>
-          <a:ln>
-            <a:noFill/>
-          </a:ln>
         </p:spPr>
-      </p:pic>
-      <p:pic>
-        <p:nvPicPr>
-          <p:cNvPr id="325" name="Google Shape;325;p21"/>
-          <p:cNvPicPr preferRelativeResize="0"/>
-          <p:nvPr/>
-        </p:nvPicPr>
-        <p:blipFill>
-          <a:blip r:embed="rId4">
-            <a:alphaModFix/>
-          </a:blip>
-          <a:stretch>
-            <a:fillRect/>
-          </a:stretch>
-        </p:blipFill>
-        <p:spPr>
-          <a:xfrm>
-            <a:off x="1303800" y="1834825"/>
-            <a:ext cx="4000878" cy="821475"/>
-          </a:xfrm>
-          <a:prstGeom prst="rect">
-            <a:avLst/>
-          </a:prstGeom>
-          <a:noFill/>
-          <a:ln>
-            <a:noFill/>
-          </a:ln>
-        </p:spPr>
-      </p:pic>
+        <p:txBody>
+          <a:bodyPr anchorCtr="0" anchor="t" bIns="91425" lIns="91425" spcFirstLastPara="1" rIns="91425" wrap="square" tIns="91425">
+            <a:noAutofit/>
+          </a:bodyPr>
+          <a:lstStyle/>
+          <a:p>
+            <a:pPr indent="-330200" lvl="0" marL="457200" rtl="0" algn="l">
+              <a:spcBef>
+                <a:spcPts val="0"/>
+              </a:spcBef>
+              <a:spcAft>
+                <a:spcPts val="0"/>
+              </a:spcAft>
+              <a:buSzPts val="1600"/>
+              <a:buChar char="●"/>
+            </a:pPr>
+            <a:r>
+              <a:rPr lang="en" sz="1600"/>
+              <a:t>dimensionality-reduction method: for analysis, it is often necessary to reduce the dimensionality of large data sets</a:t>
+            </a:r>
+            <a:endParaRPr sz="1600"/>
+          </a:p>
+          <a:p>
+            <a:pPr indent="-330200" lvl="0" marL="457200" rtl="0" algn="l">
+              <a:spcBef>
+                <a:spcPts val="0"/>
+              </a:spcBef>
+              <a:spcAft>
+                <a:spcPts val="0"/>
+              </a:spcAft>
+              <a:buSzPts val="1600"/>
+              <a:buChar char="●"/>
+            </a:pPr>
+            <a:r>
+              <a:rPr lang="en" sz="1600"/>
+              <a:t>transforming a large set of variables into a smaller one that still contains most of the information in the large set.</a:t>
+            </a:r>
+            <a:endParaRPr sz="1600"/>
+          </a:p>
+          <a:p>
+            <a:pPr indent="-330200" lvl="0" marL="457200" rtl="0" algn="l">
+              <a:spcBef>
+                <a:spcPts val="0"/>
+              </a:spcBef>
+              <a:spcAft>
+                <a:spcPts val="0"/>
+              </a:spcAft>
+              <a:buSzPts val="1600"/>
+              <a:buChar char="●"/>
+            </a:pPr>
+            <a:r>
+              <a:rPr lang="en" sz="1600"/>
+              <a:t>small loss of accuracy, but the aim is to achieve a simpler dataset by preserving as much information as possible. </a:t>
+            </a:r>
+            <a:endParaRPr sz="1600"/>
+          </a:p>
+          <a:p>
+            <a:pPr indent="-330200" lvl="0" marL="457200" rtl="0" algn="l">
+              <a:spcBef>
+                <a:spcPts val="0"/>
+              </a:spcBef>
+              <a:spcAft>
+                <a:spcPts val="0"/>
+              </a:spcAft>
+              <a:buSzPts val="1600"/>
+              <a:buChar char="●"/>
+            </a:pPr>
+            <a:r>
+              <a:rPr lang="en" sz="1600"/>
+              <a:t>Steps: standardization, covariance matrix computation, and identify principal components by computing the eigenvalues of the covariance matrix.</a:t>
+            </a:r>
+            <a:endParaRPr sz="1600"/>
+          </a:p>
+          <a:p>
+            <a:pPr indent="-330200" lvl="0" marL="457200" rtl="0" algn="l">
+              <a:spcBef>
+                <a:spcPts val="0"/>
+              </a:spcBef>
+              <a:spcAft>
+                <a:spcPts val="0"/>
+              </a:spcAft>
+              <a:buSzPts val="1600"/>
+              <a:buChar char="●"/>
+            </a:pPr>
+            <a:r>
+              <a:rPr lang="en" sz="1600"/>
+              <a:t>For standardization: subtract the mean and divide by the standard deviation for each value of each variable.</a:t>
+            </a:r>
+            <a:endParaRPr sz="1600"/>
+          </a:p>
+        </p:txBody>
+      </p:sp>
     </p:spTree>
   </p:cSld>
   <p:clrMapOvr>
@@ -17488,6 +18094,285 @@
 </file>
 
 <file path=ppt/theme/theme1.xml><?xml version="1.0" encoding="utf-8"?>
+<a:theme xmlns:a="http://schemas.openxmlformats.org/drawingml/2006/main" xmlns:r="http://schemas.openxmlformats.org/officeDocument/2006/relationships" name="Momentum">
+  <a:themeElements>
+    <a:clrScheme name="Momentum">
+      <a:dk1>
+        <a:srgbClr val="C0791B"/>
+      </a:dk1>
+      <a:lt1>
+        <a:srgbClr val="FFFFFF"/>
+      </a:lt1>
+      <a:dk2>
+        <a:srgbClr val="424242"/>
+      </a:dk2>
+      <a:lt2>
+        <a:srgbClr val="8DD8D3"/>
+      </a:lt2>
+      <a:accent1>
+        <a:srgbClr val="0B6374"/>
+      </a:accent1>
+      <a:accent2>
+        <a:srgbClr val="FD5B58"/>
+      </a:accent2>
+      <a:accent3>
+        <a:srgbClr val="599191"/>
+      </a:accent3>
+      <a:accent4>
+        <a:srgbClr val="D7E6A3"/>
+      </a:accent4>
+      <a:accent5>
+        <a:srgbClr val="27278B"/>
+      </a:accent5>
+      <a:accent6>
+        <a:srgbClr val="D558AB"/>
+      </a:accent6>
+      <a:hlink>
+        <a:srgbClr val="27278B"/>
+      </a:hlink>
+      <a:folHlink>
+        <a:srgbClr val="27278B"/>
+      </a:folHlink>
+    </a:clrScheme>
+    <a:fontScheme name="Office">
+      <a:majorFont>
+        <a:latin typeface="Arial"/>
+        <a:ea typeface=""/>
+        <a:cs typeface=""/>
+        <a:font script="Jpan" typeface="ＭＳ Ｐゴシック"/>
+        <a:font script="Hang" typeface="맑은 고딕"/>
+        <a:font script="Hans" typeface="宋体"/>
+        <a:font script="Hant" typeface="新細明體"/>
+        <a:font script="Arab" typeface="Times New Roman"/>
+        <a:font script="Hebr" typeface="Times New Roman"/>
+        <a:font script="Thai" typeface="Angsana New"/>
+        <a:font script="Ethi" typeface="Nyala"/>
+        <a:font script="Beng" typeface="Vrinda"/>
+        <a:font script="Gujr" typeface="Shruti"/>
+        <a:font script="Khmr" typeface="MoolBoran"/>
+        <a:font script="Knda" typeface="Tunga"/>
+        <a:font script="Guru" typeface="Raavi"/>
+        <a:font script="Cans" typeface="Euphemia"/>
+        <a:font script="Cher" typeface="Plantagenet Cherokee"/>
+        <a:font script="Yiii" typeface="Microsoft Yi Baiti"/>
+        <a:font script="Tibt" typeface="Microsoft Himalaya"/>
+        <a:font script="Thaa" typeface="MV Boli"/>
+        <a:font script="Deva" typeface="Mangal"/>
+        <a:font script="Telu" typeface="Gautami"/>
+        <a:font script="Taml" typeface="Latha"/>
+        <a:font script="Syrc" typeface="Estrangelo Edessa"/>
+        <a:font script="Orya" typeface="Kalinga"/>
+        <a:font script="Mlym" typeface="Kartika"/>
+        <a:font script="Laoo" typeface="DokChampa"/>
+        <a:font script="Sinh" typeface="Iskoola Pota"/>
+        <a:font script="Mong" typeface="Mongolian Baiti"/>
+        <a:font script="Viet" typeface="Times New Roman"/>
+        <a:font script="Uigh" typeface="Microsoft Uighur"/>
+        <a:font script="Geor" typeface="Sylfaen"/>
+      </a:majorFont>
+      <a:minorFont>
+        <a:latin typeface="Arial"/>
+        <a:ea typeface=""/>
+        <a:cs typeface=""/>
+        <a:font script="Jpan" typeface="ＭＳ Ｐゴシック"/>
+        <a:font script="Hang" typeface="맑은 고딕"/>
+        <a:font script="Hans" typeface="宋体"/>
+        <a:font script="Hant" typeface="新細明體"/>
+        <a:font script="Arab" typeface="Arial"/>
+        <a:font script="Hebr" typeface="Arial"/>
+        <a:font script="Thai" typeface="Cordia New"/>
+        <a:font script="Ethi" typeface="Nyala"/>
+        <a:font script="Beng" typeface="Vrinda"/>
+        <a:font script="Gujr" typeface="Shruti"/>
+        <a:font script="Khmr" typeface="DaunPenh"/>
+        <a:font script="Knda" typeface="Tunga"/>
+        <a:font script="Guru" typeface="Raavi"/>
+        <a:font script="Cans" typeface="Euphemia"/>
+        <a:font script="Cher" typeface="Plantagenet Cherokee"/>
+        <a:font script="Yiii" typeface="Microsoft Yi Baiti"/>
+        <a:font script="Tibt" typeface="Microsoft Himalaya"/>
+        <a:font script="Thaa" typeface="MV Boli"/>
+        <a:font script="Deva" typeface="Mangal"/>
+        <a:font script="Telu" typeface="Gautami"/>
+        <a:font script="Taml" typeface="Latha"/>
+        <a:font script="Syrc" typeface="Estrangelo Edessa"/>
+        <a:font script="Orya" typeface="Kalinga"/>
+        <a:font script="Mlym" typeface="Kartika"/>
+        <a:font script="Laoo" typeface="DokChampa"/>
+        <a:font script="Sinh" typeface="Iskoola Pota"/>
+        <a:font script="Mong" typeface="Mongolian Baiti"/>
+        <a:font script="Viet" typeface="Arial"/>
+        <a:font script="Uigh" typeface="Microsoft Uighur"/>
+        <a:font script="Geor" typeface="Sylfaen"/>
+      </a:minorFont>
+    </a:fontScheme>
+    <a:fmtScheme name="Office">
+      <a:fillStyleLst>
+        <a:solidFill>
+          <a:schemeClr val="phClr"/>
+        </a:solidFill>
+        <a:gradFill rotWithShape="1">
+          <a:gsLst>
+            <a:gs pos="0">
+              <a:schemeClr val="phClr">
+                <a:tint val="50000"/>
+                <a:satMod val="300000"/>
+              </a:schemeClr>
+            </a:gs>
+            <a:gs pos="35000">
+              <a:schemeClr val="phClr">
+                <a:tint val="37000"/>
+                <a:satMod val="300000"/>
+              </a:schemeClr>
+            </a:gs>
+            <a:gs pos="100000">
+              <a:schemeClr val="phClr">
+                <a:tint val="15000"/>
+                <a:satMod val="350000"/>
+              </a:schemeClr>
+            </a:gs>
+          </a:gsLst>
+          <a:lin ang="16200000" scaled="1"/>
+        </a:gradFill>
+        <a:gradFill rotWithShape="1">
+          <a:gsLst>
+            <a:gs pos="0">
+              <a:schemeClr val="phClr">
+                <a:tint val="100000"/>
+                <a:shade val="100000"/>
+                <a:satMod val="130000"/>
+              </a:schemeClr>
+            </a:gs>
+            <a:gs pos="100000">
+              <a:schemeClr val="phClr">
+                <a:tint val="50000"/>
+                <a:shade val="100000"/>
+                <a:satMod val="350000"/>
+              </a:schemeClr>
+            </a:gs>
+          </a:gsLst>
+          <a:lin ang="16200000" scaled="0"/>
+        </a:gradFill>
+      </a:fillStyleLst>
+      <a:lnStyleLst>
+        <a:ln w="9525" cap="flat" cmpd="sng" algn="ctr">
+          <a:solidFill>
+            <a:schemeClr val="phClr">
+              <a:shade val="95000"/>
+              <a:satMod val="105000"/>
+            </a:schemeClr>
+          </a:solidFill>
+          <a:prstDash val="solid"/>
+        </a:ln>
+        <a:ln w="25400" cap="flat" cmpd="sng" algn="ctr">
+          <a:solidFill>
+            <a:schemeClr val="phClr"/>
+          </a:solidFill>
+          <a:prstDash val="solid"/>
+        </a:ln>
+        <a:ln w="38100" cap="flat" cmpd="sng" algn="ctr">
+          <a:solidFill>
+            <a:schemeClr val="phClr"/>
+          </a:solidFill>
+          <a:prstDash val="solid"/>
+        </a:ln>
+      </a:lnStyleLst>
+      <a:effectStyleLst>
+        <a:effectStyle>
+          <a:effectLst>
+            <a:outerShdw blurRad="40000" dist="20000" dir="5400000" rotWithShape="0">
+              <a:srgbClr val="000000">
+                <a:alpha val="38000"/>
+              </a:srgbClr>
+            </a:outerShdw>
+          </a:effectLst>
+        </a:effectStyle>
+        <a:effectStyle>
+          <a:effectLst>
+            <a:outerShdw blurRad="40000" dist="23000" dir="5400000" rotWithShape="0">
+              <a:srgbClr val="000000">
+                <a:alpha val="35000"/>
+              </a:srgbClr>
+            </a:outerShdw>
+          </a:effectLst>
+        </a:effectStyle>
+        <a:effectStyle>
+          <a:effectLst>
+            <a:outerShdw blurRad="40000" dist="23000" dir="5400000" rotWithShape="0">
+              <a:srgbClr val="000000">
+                <a:alpha val="35000"/>
+              </a:srgbClr>
+            </a:outerShdw>
+          </a:effectLst>
+          <a:scene3d>
+            <a:camera prst="orthographicFront">
+              <a:rot lat="0" lon="0" rev="0"/>
+            </a:camera>
+            <a:lightRig rig="threePt" dir="t">
+              <a:rot lat="0" lon="0" rev="1200000"/>
+            </a:lightRig>
+          </a:scene3d>
+          <a:sp3d>
+            <a:bevelT w="63500" h="25400"/>
+          </a:sp3d>
+        </a:effectStyle>
+      </a:effectStyleLst>
+      <a:bgFillStyleLst>
+        <a:solidFill>
+          <a:schemeClr val="phClr"/>
+        </a:solidFill>
+        <a:gradFill rotWithShape="1">
+          <a:gsLst>
+            <a:gs pos="0">
+              <a:schemeClr val="phClr">
+                <a:tint val="40000"/>
+                <a:satMod val="350000"/>
+              </a:schemeClr>
+            </a:gs>
+            <a:gs pos="40000">
+              <a:schemeClr val="phClr">
+                <a:tint val="45000"/>
+                <a:shade val="99000"/>
+                <a:satMod val="350000"/>
+              </a:schemeClr>
+            </a:gs>
+            <a:gs pos="100000">
+              <a:schemeClr val="phClr">
+                <a:shade val="20000"/>
+                <a:satMod val="255000"/>
+              </a:schemeClr>
+            </a:gs>
+          </a:gsLst>
+          <a:path path="circle">
+            <a:fillToRect l="50000" t="-80000" r="50000" b="180000"/>
+          </a:path>
+        </a:gradFill>
+        <a:gradFill rotWithShape="1">
+          <a:gsLst>
+            <a:gs pos="0">
+              <a:schemeClr val="phClr">
+                <a:tint val="80000"/>
+                <a:satMod val="300000"/>
+              </a:schemeClr>
+            </a:gs>
+            <a:gs pos="100000">
+              <a:schemeClr val="phClr">
+                <a:shade val="30000"/>
+                <a:satMod val="200000"/>
+              </a:schemeClr>
+            </a:gs>
+          </a:gsLst>
+          <a:path path="circle">
+            <a:fillToRect l="50000" t="50000" r="50000" b="50000"/>
+          </a:path>
+        </a:gradFill>
+      </a:bgFillStyleLst>
+    </a:fmtScheme>
+  </a:themeElements>
+</a:theme>
+</file>
+
+<file path=ppt/theme/theme2.xml><?xml version="1.0" encoding="utf-8"?>
 <a:theme xmlns:a="http://schemas.openxmlformats.org/drawingml/2006/main" xmlns:r="http://schemas.openxmlformats.org/officeDocument/2006/relationships">
   <a:themeElements>
     <a:clrScheme name="Default">
@@ -17764,283 +18649,4 @@
     </a:fmtScheme>
   </a:themeElements>
 </a:theme>
-</file>
-
-<file path=ppt/theme/theme2.xml><?xml version="1.0" encoding="utf-8"?>
-<a:theme xmlns:a="http://schemas.openxmlformats.org/drawingml/2006/main" xmlns:r="http://schemas.openxmlformats.org/officeDocument/2006/relationships" name="Momentum">
-  <a:themeElements>
-    <a:clrScheme name="Momentum">
-      <a:dk1>
-        <a:srgbClr val="C0791B"/>
-      </a:dk1>
-      <a:lt1>
-        <a:srgbClr val="FFFFFF"/>
-      </a:lt1>
-      <a:dk2>
-        <a:srgbClr val="424242"/>
-      </a:dk2>
-      <a:lt2>
-        <a:srgbClr val="8DD8D3"/>
-      </a:lt2>
-      <a:accent1>
-        <a:srgbClr val="0B6374"/>
-      </a:accent1>
-      <a:accent2>
-        <a:srgbClr val="FD5B58"/>
-      </a:accent2>
-      <a:accent3>
-        <a:srgbClr val="599191"/>
-      </a:accent3>
-      <a:accent4>
-        <a:srgbClr val="D7E6A3"/>
-      </a:accent4>
-      <a:accent5>
-        <a:srgbClr val="27278B"/>
-      </a:accent5>
-      <a:accent6>
-        <a:srgbClr val="D558AB"/>
-      </a:accent6>
-      <a:hlink>
-        <a:srgbClr val="27278B"/>
-      </a:hlink>
-      <a:folHlink>
-        <a:srgbClr val="27278B"/>
-      </a:folHlink>
-    </a:clrScheme>
-    <a:fontScheme name="Office">
-      <a:majorFont>
-        <a:latin typeface="Arial"/>
-        <a:ea typeface=""/>
-        <a:cs typeface=""/>
-        <a:font script="Jpan" typeface="ＭＳ Ｐゴシック"/>
-        <a:font script="Hang" typeface="맑은 고딕"/>
-        <a:font script="Hans" typeface="宋体"/>
-        <a:font script="Hant" typeface="新細明體"/>
-        <a:font script="Arab" typeface="Times New Roman"/>
-        <a:font script="Hebr" typeface="Times New Roman"/>
-        <a:font script="Thai" typeface="Angsana New"/>
-        <a:font script="Ethi" typeface="Nyala"/>
-        <a:font script="Beng" typeface="Vrinda"/>
-        <a:font script="Gujr" typeface="Shruti"/>
-        <a:font script="Khmr" typeface="MoolBoran"/>
-        <a:font script="Knda" typeface="Tunga"/>
-        <a:font script="Guru" typeface="Raavi"/>
-        <a:font script="Cans" typeface="Euphemia"/>
-        <a:font script="Cher" typeface="Plantagenet Cherokee"/>
-        <a:font script="Yiii" typeface="Microsoft Yi Baiti"/>
-        <a:font script="Tibt" typeface="Microsoft Himalaya"/>
-        <a:font script="Thaa" typeface="MV Boli"/>
-        <a:font script="Deva" typeface="Mangal"/>
-        <a:font script="Telu" typeface="Gautami"/>
-        <a:font script="Taml" typeface="Latha"/>
-        <a:font script="Syrc" typeface="Estrangelo Edessa"/>
-        <a:font script="Orya" typeface="Kalinga"/>
-        <a:font script="Mlym" typeface="Kartika"/>
-        <a:font script="Laoo" typeface="DokChampa"/>
-        <a:font script="Sinh" typeface="Iskoola Pota"/>
-        <a:font script="Mong" typeface="Mongolian Baiti"/>
-        <a:font script="Viet" typeface="Times New Roman"/>
-        <a:font script="Uigh" typeface="Microsoft Uighur"/>
-        <a:font script="Geor" typeface="Sylfaen"/>
-      </a:majorFont>
-      <a:minorFont>
-        <a:latin typeface="Arial"/>
-        <a:ea typeface=""/>
-        <a:cs typeface=""/>
-        <a:font script="Jpan" typeface="ＭＳ Ｐゴシック"/>
-        <a:font script="Hang" typeface="맑은 고딕"/>
-        <a:font script="Hans" typeface="宋体"/>
-        <a:font script="Hant" typeface="新細明體"/>
-        <a:font script="Arab" typeface="Arial"/>
-        <a:font script="Hebr" typeface="Arial"/>
-        <a:font script="Thai" typeface="Cordia New"/>
-        <a:font script="Ethi" typeface="Nyala"/>
-        <a:font script="Beng" typeface="Vrinda"/>
-        <a:font script="Gujr" typeface="Shruti"/>
-        <a:font script="Khmr" typeface="DaunPenh"/>
-        <a:font script="Knda" typeface="Tunga"/>
-        <a:font script="Guru" typeface="Raavi"/>
-        <a:font script="Cans" typeface="Euphemia"/>
-        <a:font script="Cher" typeface="Plantagenet Cherokee"/>
-        <a:font script="Yiii" typeface="Microsoft Yi Baiti"/>
-        <a:font script="Tibt" typeface="Microsoft Himalaya"/>
-        <a:font script="Thaa" typeface="MV Boli"/>
-        <a:font script="Deva" typeface="Mangal"/>
-        <a:font script="Telu" typeface="Gautami"/>
-        <a:font script="Taml" typeface="Latha"/>
-        <a:font script="Syrc" typeface="Estrangelo Edessa"/>
-        <a:font script="Orya" typeface="Kalinga"/>
-        <a:font script="Mlym" typeface="Kartika"/>
-        <a:font script="Laoo" typeface="DokChampa"/>
-        <a:font script="Sinh" typeface="Iskoola Pota"/>
-        <a:font script="Mong" typeface="Mongolian Baiti"/>
-        <a:font script="Viet" typeface="Arial"/>
-        <a:font script="Uigh" typeface="Microsoft Uighur"/>
-        <a:font script="Geor" typeface="Sylfaen"/>
-      </a:minorFont>
-    </a:fontScheme>
-    <a:fmtScheme name="Office">
-      <a:fillStyleLst>
-        <a:solidFill>
-          <a:schemeClr val="phClr"/>
-        </a:solidFill>
-        <a:gradFill rotWithShape="1">
-          <a:gsLst>
-            <a:gs pos="0">
-              <a:schemeClr val="phClr">
-                <a:tint val="50000"/>
-                <a:satMod val="300000"/>
-              </a:schemeClr>
-            </a:gs>
-            <a:gs pos="35000">
-              <a:schemeClr val="phClr">
-                <a:tint val="37000"/>
-                <a:satMod val="300000"/>
-              </a:schemeClr>
-            </a:gs>
-            <a:gs pos="100000">
-              <a:schemeClr val="phClr">
-                <a:tint val="15000"/>
-                <a:satMod val="350000"/>
-              </a:schemeClr>
-            </a:gs>
-          </a:gsLst>
-          <a:lin ang="16200000" scaled="1"/>
-        </a:gradFill>
-        <a:gradFill rotWithShape="1">
-          <a:gsLst>
-            <a:gs pos="0">
-              <a:schemeClr val="phClr">
-                <a:tint val="100000"/>
-                <a:shade val="100000"/>
-                <a:satMod val="130000"/>
-              </a:schemeClr>
-            </a:gs>
-            <a:gs pos="100000">
-              <a:schemeClr val="phClr">
-                <a:tint val="50000"/>
-                <a:shade val="100000"/>
-                <a:satMod val="350000"/>
-              </a:schemeClr>
-            </a:gs>
-          </a:gsLst>
-          <a:lin ang="16200000" scaled="0"/>
-        </a:gradFill>
-      </a:fillStyleLst>
-      <a:lnStyleLst>
-        <a:ln w="9525" cap="flat" cmpd="sng" algn="ctr">
-          <a:solidFill>
-            <a:schemeClr val="phClr">
-              <a:shade val="95000"/>
-              <a:satMod val="105000"/>
-            </a:schemeClr>
-          </a:solidFill>
-          <a:prstDash val="solid"/>
-        </a:ln>
-        <a:ln w="25400" cap="flat" cmpd="sng" algn="ctr">
-          <a:solidFill>
-            <a:schemeClr val="phClr"/>
-          </a:solidFill>
-          <a:prstDash val="solid"/>
-        </a:ln>
-        <a:ln w="38100" cap="flat" cmpd="sng" algn="ctr">
-          <a:solidFill>
-            <a:schemeClr val="phClr"/>
-          </a:solidFill>
-          <a:prstDash val="solid"/>
-        </a:ln>
-      </a:lnStyleLst>
-      <a:effectStyleLst>
-        <a:effectStyle>
-          <a:effectLst>
-            <a:outerShdw blurRad="40000" dist="20000" dir="5400000" rotWithShape="0">
-              <a:srgbClr val="000000">
-                <a:alpha val="38000"/>
-              </a:srgbClr>
-            </a:outerShdw>
-          </a:effectLst>
-        </a:effectStyle>
-        <a:effectStyle>
-          <a:effectLst>
-            <a:outerShdw blurRad="40000" dist="23000" dir="5400000" rotWithShape="0">
-              <a:srgbClr val="000000">
-                <a:alpha val="35000"/>
-              </a:srgbClr>
-            </a:outerShdw>
-          </a:effectLst>
-        </a:effectStyle>
-        <a:effectStyle>
-          <a:effectLst>
-            <a:outerShdw blurRad="40000" dist="23000" dir="5400000" rotWithShape="0">
-              <a:srgbClr val="000000">
-                <a:alpha val="35000"/>
-              </a:srgbClr>
-            </a:outerShdw>
-          </a:effectLst>
-          <a:scene3d>
-            <a:camera prst="orthographicFront">
-              <a:rot lat="0" lon="0" rev="0"/>
-            </a:camera>
-            <a:lightRig rig="threePt" dir="t">
-              <a:rot lat="0" lon="0" rev="1200000"/>
-            </a:lightRig>
-          </a:scene3d>
-          <a:sp3d>
-            <a:bevelT w="63500" h="25400"/>
-          </a:sp3d>
-        </a:effectStyle>
-      </a:effectStyleLst>
-      <a:bgFillStyleLst>
-        <a:solidFill>
-          <a:schemeClr val="phClr"/>
-        </a:solidFill>
-        <a:gradFill rotWithShape="1">
-          <a:gsLst>
-            <a:gs pos="0">
-              <a:schemeClr val="phClr">
-                <a:tint val="40000"/>
-                <a:satMod val="350000"/>
-              </a:schemeClr>
-            </a:gs>
-            <a:gs pos="40000">
-              <a:schemeClr val="phClr">
-                <a:tint val="45000"/>
-                <a:shade val="99000"/>
-                <a:satMod val="350000"/>
-              </a:schemeClr>
-            </a:gs>
-            <a:gs pos="100000">
-              <a:schemeClr val="phClr">
-                <a:shade val="20000"/>
-                <a:satMod val="255000"/>
-              </a:schemeClr>
-            </a:gs>
-          </a:gsLst>
-          <a:path path="circle">
-            <a:fillToRect l="50000" t="-80000" r="50000" b="180000"/>
-          </a:path>
-        </a:gradFill>
-        <a:gradFill rotWithShape="1">
-          <a:gsLst>
-            <a:gs pos="0">
-              <a:schemeClr val="phClr">
-                <a:tint val="80000"/>
-                <a:satMod val="300000"/>
-              </a:schemeClr>
-            </a:gs>
-            <a:gs pos="100000">
-              <a:schemeClr val="phClr">
-                <a:shade val="30000"/>
-                <a:satMod val="200000"/>
-              </a:schemeClr>
-            </a:gs>
-          </a:gsLst>
-          <a:path path="circle">
-            <a:fillToRect l="50000" t="50000" r="50000" b="50000"/>
-          </a:path>
-        </a:gradFill>
-      </a:bgFillStyleLst>
-    </a:fmtScheme>
-  </a:themeElements>
-</a:theme>
 </file>
</xml_diff>